<commit_message>
Added a note about static methods and decorators in the recap section.
</commit_message>
<xml_diff>
--- a/Python as an additional language/Lesson 6/Session 6.pptx
+++ b/Python as an additional language/Lesson 6/Session 6.pptx
@@ -5,23 +5,24 @@
     <p:sldMasterId id="2147483648" r:id="rId1"/>
   </p:sldMasterIdLst>
   <p:notesMasterIdLst>
-    <p:notesMasterId r:id="rId16"/>
+    <p:notesMasterId r:id="rId17"/>
   </p:notesMasterIdLst>
   <p:sldIdLst>
     <p:sldId id="258" r:id="rId2"/>
     <p:sldId id="257" r:id="rId3"/>
-    <p:sldId id="269" r:id="rId4"/>
-    <p:sldId id="270" r:id="rId5"/>
-    <p:sldId id="271" r:id="rId6"/>
-    <p:sldId id="268" r:id="rId7"/>
-    <p:sldId id="259" r:id="rId8"/>
-    <p:sldId id="260" r:id="rId9"/>
-    <p:sldId id="266" r:id="rId10"/>
-    <p:sldId id="261" r:id="rId11"/>
-    <p:sldId id="262" r:id="rId12"/>
-    <p:sldId id="263" r:id="rId13"/>
-    <p:sldId id="264" r:id="rId14"/>
-    <p:sldId id="265" r:id="rId15"/>
+    <p:sldId id="272" r:id="rId4"/>
+    <p:sldId id="269" r:id="rId5"/>
+    <p:sldId id="270" r:id="rId6"/>
+    <p:sldId id="271" r:id="rId7"/>
+    <p:sldId id="268" r:id="rId8"/>
+    <p:sldId id="259" r:id="rId9"/>
+    <p:sldId id="260" r:id="rId10"/>
+    <p:sldId id="266" r:id="rId11"/>
+    <p:sldId id="261" r:id="rId12"/>
+    <p:sldId id="262" r:id="rId13"/>
+    <p:sldId id="263" r:id="rId14"/>
+    <p:sldId id="264" r:id="rId15"/>
+    <p:sldId id="265" r:id="rId16"/>
   </p:sldIdLst>
   <p:sldSz cx="12192000" cy="6858000"/>
   <p:notesSz cx="6858000" cy="9144000"/>
@@ -210,7 +211,7 @@
           <a:p>
             <a:fld id="{DA5E5883-E103-8245-BD61-201BBE7EF848}" type="datetimeFigureOut">
               <a:rPr lang="en-US" smtClean="0"/>
-              <a:t>3/8/17</a:t>
+              <a:t>6/30/17</a:t>
             </a:fld>
             <a:endParaRPr lang="en-US"/>
           </a:p>
@@ -478,6 +479,102 @@
 </p:notesMaster>
 </file>
 
+<file path=ppt/notesSlides/notesSlide1.xml><?xml version="1.0" encoding="utf-8"?>
+<p:notes xmlns:a="http://schemas.openxmlformats.org/drawingml/2006/main" xmlns:r="http://schemas.openxmlformats.org/officeDocument/2006/relationships" xmlns:p="http://schemas.openxmlformats.org/presentationml/2006/main">
+  <p:cSld>
+    <p:spTree>
+      <p:nvGrpSpPr>
+        <p:cNvPr id="1" name=""/>
+        <p:cNvGrpSpPr/>
+        <p:nvPr/>
+      </p:nvGrpSpPr>
+      <p:grpSpPr>
+        <a:xfrm>
+          <a:off x="0" y="0"/>
+          <a:ext cx="0" cy="0"/>
+          <a:chOff x="0" y="0"/>
+          <a:chExt cx="0" cy="0"/>
+        </a:xfrm>
+      </p:grpSpPr>
+      <p:sp>
+        <p:nvSpPr>
+          <p:cNvPr id="2" name="Slide Image Placeholder 1"/>
+          <p:cNvSpPr>
+            <a:spLocks noGrp="1" noRot="1" noChangeAspect="1"/>
+          </p:cNvSpPr>
+          <p:nvPr>
+            <p:ph type="sldImg"/>
+          </p:nvPr>
+        </p:nvSpPr>
+        <p:spPr/>
+      </p:sp>
+      <p:sp>
+        <p:nvSpPr>
+          <p:cNvPr id="3" name="Notes Placeholder 2"/>
+          <p:cNvSpPr>
+            <a:spLocks noGrp="1"/>
+          </p:cNvSpPr>
+          <p:nvPr>
+            <p:ph type="body" idx="1"/>
+          </p:nvPr>
+        </p:nvSpPr>
+        <p:spPr/>
+        <p:txBody>
+          <a:bodyPr/>
+          <a:lstStyle/>
+          <a:p>
+            <a:r>
+              <a:rPr lang="en-US" dirty="0" smtClean="0"/>
+              <a:t>I’m not going to</a:t>
+            </a:r>
+            <a:r>
+              <a:rPr lang="en-US" baseline="0" dirty="0" smtClean="0"/>
+              <a:t> go further into decorators or class methods; we </a:t>
+            </a:r>
+            <a:r>
+              <a:rPr lang="en-US" baseline="0" smtClean="0"/>
+              <a:t>only have so much time. </a:t>
+            </a:r>
+            <a:endParaRPr lang="en-US" dirty="0"/>
+          </a:p>
+        </p:txBody>
+      </p:sp>
+      <p:sp>
+        <p:nvSpPr>
+          <p:cNvPr id="4" name="Slide Number Placeholder 3"/>
+          <p:cNvSpPr>
+            <a:spLocks noGrp="1"/>
+          </p:cNvSpPr>
+          <p:nvPr>
+            <p:ph type="sldNum" sz="quarter" idx="10"/>
+          </p:nvPr>
+        </p:nvSpPr>
+        <p:spPr/>
+        <p:txBody>
+          <a:bodyPr/>
+          <a:lstStyle/>
+          <a:p>
+            <a:fld id="{19D6B4EB-9216-6B43-A5DA-B470951A8D10}" type="slidenum">
+              <a:rPr lang="en-US" smtClean="0"/>
+              <a:t>3</a:t>
+            </a:fld>
+            <a:endParaRPr lang="en-US"/>
+          </a:p>
+        </p:txBody>
+      </p:sp>
+    </p:spTree>
+    <p:extLst>
+      <p:ext uri="{BB962C8B-B14F-4D97-AF65-F5344CB8AC3E}">
+        <p14:creationId xmlns:p14="http://schemas.microsoft.com/office/powerpoint/2010/main" val="663504601"/>
+      </p:ext>
+    </p:extLst>
+  </p:cSld>
+  <p:clrMapOvr>
+    <a:masterClrMapping/>
+  </p:clrMapOvr>
+</p:notes>
+</file>
+
 <file path=ppt/slideLayouts/slideLayout1.xml><?xml version="1.0" encoding="utf-8"?>
 <p:sldLayout xmlns:a="http://schemas.openxmlformats.org/drawingml/2006/main" xmlns:r="http://schemas.openxmlformats.org/officeDocument/2006/relationships" xmlns:p="http://schemas.openxmlformats.org/presentationml/2006/main" type="title" preserve="1">
   <p:cSld name="Title Slide">
@@ -609,7 +706,7 @@
           <a:p>
             <a:fld id="{6772480F-65C4-1944-8E55-882D628A8DFA}" type="datetimeFigureOut">
               <a:rPr lang="en-US" smtClean="0"/>
-              <a:t>3/8/17</a:t>
+              <a:t>6/30/17</a:t>
             </a:fld>
             <a:endParaRPr lang="en-US"/>
           </a:p>
@@ -779,7 +876,7 @@
           <a:p>
             <a:fld id="{6772480F-65C4-1944-8E55-882D628A8DFA}" type="datetimeFigureOut">
               <a:rPr lang="en-US" smtClean="0"/>
-              <a:t>3/8/17</a:t>
+              <a:t>6/30/17</a:t>
             </a:fld>
             <a:endParaRPr lang="en-US"/>
           </a:p>
@@ -959,7 +1056,7 @@
           <a:p>
             <a:fld id="{6772480F-65C4-1944-8E55-882D628A8DFA}" type="datetimeFigureOut">
               <a:rPr lang="en-US" smtClean="0"/>
-              <a:t>3/8/17</a:t>
+              <a:t>6/30/17</a:t>
             </a:fld>
             <a:endParaRPr lang="en-US"/>
           </a:p>
@@ -1129,7 +1226,7 @@
           <a:p>
             <a:fld id="{6772480F-65C4-1944-8E55-882D628A8DFA}" type="datetimeFigureOut">
               <a:rPr lang="en-US" smtClean="0"/>
-              <a:t>3/8/17</a:t>
+              <a:t>6/30/17</a:t>
             </a:fld>
             <a:endParaRPr lang="en-US"/>
           </a:p>
@@ -1375,7 +1472,7 @@
           <a:p>
             <a:fld id="{6772480F-65C4-1944-8E55-882D628A8DFA}" type="datetimeFigureOut">
               <a:rPr lang="en-US" smtClean="0"/>
-              <a:t>3/8/17</a:t>
+              <a:t>6/30/17</a:t>
             </a:fld>
             <a:endParaRPr lang="en-US"/>
           </a:p>
@@ -1607,7 +1704,7 @@
           <a:p>
             <a:fld id="{6772480F-65C4-1944-8E55-882D628A8DFA}" type="datetimeFigureOut">
               <a:rPr lang="en-US" smtClean="0"/>
-              <a:t>3/8/17</a:t>
+              <a:t>6/30/17</a:t>
             </a:fld>
             <a:endParaRPr lang="en-US"/>
           </a:p>
@@ -1974,7 +2071,7 @@
           <a:p>
             <a:fld id="{6772480F-65C4-1944-8E55-882D628A8DFA}" type="datetimeFigureOut">
               <a:rPr lang="en-US" smtClean="0"/>
-              <a:t>3/8/17</a:t>
+              <a:t>6/30/17</a:t>
             </a:fld>
             <a:endParaRPr lang="en-US"/>
           </a:p>
@@ -2092,7 +2189,7 @@
           <a:p>
             <a:fld id="{6772480F-65C4-1944-8E55-882D628A8DFA}" type="datetimeFigureOut">
               <a:rPr lang="en-US" smtClean="0"/>
-              <a:t>3/8/17</a:t>
+              <a:t>6/30/17</a:t>
             </a:fld>
             <a:endParaRPr lang="en-US"/>
           </a:p>
@@ -2187,7 +2284,7 @@
           <a:p>
             <a:fld id="{6772480F-65C4-1944-8E55-882D628A8DFA}" type="datetimeFigureOut">
               <a:rPr lang="en-US" smtClean="0"/>
-              <a:t>3/8/17</a:t>
+              <a:t>6/30/17</a:t>
             </a:fld>
             <a:endParaRPr lang="en-US"/>
           </a:p>
@@ -2464,7 +2561,7 @@
           <a:p>
             <a:fld id="{6772480F-65C4-1944-8E55-882D628A8DFA}" type="datetimeFigureOut">
               <a:rPr lang="en-US" smtClean="0"/>
-              <a:t>3/8/17</a:t>
+              <a:t>6/30/17</a:t>
             </a:fld>
             <a:endParaRPr lang="en-US"/>
           </a:p>
@@ -2717,7 +2814,7 @@
           <a:p>
             <a:fld id="{6772480F-65C4-1944-8E55-882D628A8DFA}" type="datetimeFigureOut">
               <a:rPr lang="en-US" smtClean="0"/>
-              <a:t>3/8/17</a:t>
+              <a:t>6/30/17</a:t>
             </a:fld>
             <a:endParaRPr lang="en-US"/>
           </a:p>
@@ -2930,7 +3027,7 @@
           <a:p>
             <a:fld id="{6772480F-65C4-1944-8E55-882D628A8DFA}" type="datetimeFigureOut">
               <a:rPr lang="en-US" smtClean="0"/>
-              <a:t>3/8/17</a:t>
+              <a:t>6/30/17</a:t>
             </a:fld>
             <a:endParaRPr lang="en-US"/>
           </a:p>
@@ -3446,11 +3543,7 @@
           <a:p>
             <a:r>
               <a:rPr lang="en-US" sz="4000" dirty="0" smtClean="0"/>
-              <a:t>Python As An Additional </a:t>
-            </a:r>
-            <a:r>
-              <a:rPr lang="en-US" sz="4000" dirty="0" smtClean="0"/>
-              <a:t>Language</a:t>
+              <a:t>Python As An Additional Language</a:t>
             </a:r>
             <a:endParaRPr lang="en-US" sz="4000" dirty="0"/>
           </a:p>
@@ -3508,6 +3601,137 @@
 </file>
 
 <file path=ppt/slides/slide10.xml><?xml version="1.0" encoding="utf-8"?>
+<p:sld xmlns:a="http://schemas.openxmlformats.org/drawingml/2006/main" xmlns:r="http://schemas.openxmlformats.org/officeDocument/2006/relationships" xmlns:p="http://schemas.openxmlformats.org/presentationml/2006/main">
+  <p:cSld>
+    <p:spTree>
+      <p:nvGrpSpPr>
+        <p:cNvPr id="1" name=""/>
+        <p:cNvGrpSpPr/>
+        <p:nvPr/>
+      </p:nvGrpSpPr>
+      <p:grpSpPr>
+        <a:xfrm>
+          <a:off x="0" y="0"/>
+          <a:ext cx="0" cy="0"/>
+          <a:chOff x="0" y="0"/>
+          <a:chExt cx="0" cy="0"/>
+        </a:xfrm>
+      </p:grpSpPr>
+      <p:sp>
+        <p:nvSpPr>
+          <p:cNvPr id="2" name="Title 1"/>
+          <p:cNvSpPr>
+            <a:spLocks noGrp="1"/>
+          </p:cNvSpPr>
+          <p:nvPr>
+            <p:ph type="title"/>
+          </p:nvPr>
+        </p:nvSpPr>
+        <p:spPr/>
+        <p:txBody>
+          <a:bodyPr/>
+          <a:lstStyle/>
+          <a:p>
+            <a:pPr algn="ctr"/>
+            <a:r>
+              <a:rPr lang="en-US" dirty="0" smtClean="0"/>
+              <a:t>And now for something completely different</a:t>
+            </a:r>
+            <a:endParaRPr lang="en-US" dirty="0"/>
+          </a:p>
+        </p:txBody>
+      </p:sp>
+      <p:pic>
+        <p:nvPicPr>
+          <p:cNvPr id="5" name="Content Placeholder 4"/>
+          <p:cNvPicPr>
+            <a:picLocks noGrp="1" noChangeAspect="1"/>
+          </p:cNvPicPr>
+          <p:nvPr>
+            <p:ph idx="1"/>
+          </p:nvPr>
+        </p:nvPicPr>
+        <p:blipFill>
+          <a:blip r:embed="rId2">
+            <a:extLst>
+              <a:ext uri="{28A0092B-C50C-407E-A947-70E740481C1C}">
+                <a14:useLocalDpi xmlns:a14="http://schemas.microsoft.com/office/drawing/2010/main" val="0"/>
+              </a:ext>
+            </a:extLst>
+          </a:blip>
+          <a:stretch>
+            <a:fillRect/>
+          </a:stretch>
+        </p:blipFill>
+        <p:spPr>
+          <a:xfrm>
+            <a:off x="1498600" y="1690688"/>
+            <a:ext cx="9194800" cy="4000500"/>
+          </a:xfrm>
+        </p:spPr>
+      </p:pic>
+      <p:sp>
+        <p:nvSpPr>
+          <p:cNvPr id="8" name="TextBox 7"/>
+          <p:cNvSpPr txBox="1"/>
+          <p:nvPr/>
+        </p:nvSpPr>
+        <p:spPr>
+          <a:xfrm>
+            <a:off x="2167210" y="5947155"/>
+            <a:ext cx="7857573" cy="369332"/>
+          </a:xfrm>
+          <a:prstGeom prst="rect">
+            <a:avLst/>
+          </a:prstGeom>
+          <a:noFill/>
+        </p:spPr>
+        <p:txBody>
+          <a:bodyPr wrap="square" rtlCol="0">
+            <a:spAutoFit/>
+          </a:bodyPr>
+          <a:lstStyle/>
+          <a:p>
+            <a:pPr algn="ctr"/>
+            <a:r>
+              <a:rPr lang="en-US" dirty="0" smtClean="0"/>
+              <a:t>The equivalent in Python of typing </a:t>
+            </a:r>
+            <a:r>
+              <a:rPr lang="en-US" dirty="0" smtClean="0">
+                <a:hlinkClick r:id="rId3"/>
+              </a:rPr>
+              <a:t>https://www.expedia.co.uk/</a:t>
+            </a:r>
+            <a:r>
+              <a:rPr lang="en-US" dirty="0" smtClean="0"/>
+              <a:t> into your browser.</a:t>
+            </a:r>
+            <a:endParaRPr lang="en-US" dirty="0"/>
+          </a:p>
+        </p:txBody>
+      </p:sp>
+    </p:spTree>
+    <p:extLst>
+      <p:ext uri="{BB962C8B-B14F-4D97-AF65-F5344CB8AC3E}">
+        <p14:creationId xmlns:p14="http://schemas.microsoft.com/office/powerpoint/2010/main" val="262951805"/>
+      </p:ext>
+    </p:extLst>
+  </p:cSld>
+  <p:clrMapOvr>
+    <a:masterClrMapping/>
+  </p:clrMapOvr>
+  <p:timing>
+    <p:tnLst>
+      <p:par>
+        <p:cTn id="1" dur="indefinite" restart="never" nodeType="tmRoot"/>
+      </p:par>
+    </p:tnLst>
+  </p:timing>
+</p:sld>
+</file>
+
+<file path=ppt/slides/slide11.xml><?xml version="1.0" encoding="utf-8"?>
 <p:sld xmlns:a="http://schemas.openxmlformats.org/drawingml/2006/main" xmlns:r="http://schemas.openxmlformats.org/officeDocument/2006/relationships" xmlns:p="http://schemas.openxmlformats.org/presentationml/2006/main">
   <p:cSld>
     <p:spTree>
@@ -3696,7 +3920,7 @@
 </p:sld>
 </file>
 
-<file path=ppt/slides/slide11.xml><?xml version="1.0" encoding="utf-8"?>
+<file path=ppt/slides/slide12.xml><?xml version="1.0" encoding="utf-8"?>
 <p:sld xmlns:a="http://schemas.openxmlformats.org/drawingml/2006/main" xmlns:r="http://schemas.openxmlformats.org/officeDocument/2006/relationships" xmlns:p="http://schemas.openxmlformats.org/presentationml/2006/main">
   <p:cSld>
     <p:spTree>
@@ -3896,7 +4120,7 @@
 </p:sld>
 </file>
 
-<file path=ppt/slides/slide12.xml><?xml version="1.0" encoding="utf-8"?>
+<file path=ppt/slides/slide13.xml><?xml version="1.0" encoding="utf-8"?>
 <p:sld xmlns:a="http://schemas.openxmlformats.org/drawingml/2006/main" xmlns:r="http://schemas.openxmlformats.org/officeDocument/2006/relationships" xmlns:p="http://schemas.openxmlformats.org/presentationml/2006/main">
   <p:cSld>
     <p:spTree>
@@ -4016,7 +4240,7 @@
 </p:sld>
 </file>
 
-<file path=ppt/slides/slide13.xml><?xml version="1.0" encoding="utf-8"?>
+<file path=ppt/slides/slide14.xml><?xml version="1.0" encoding="utf-8"?>
 <p:sld xmlns:a="http://schemas.openxmlformats.org/drawingml/2006/main" xmlns:r="http://schemas.openxmlformats.org/officeDocument/2006/relationships" xmlns:p="http://schemas.openxmlformats.org/presentationml/2006/main">
   <p:cSld>
     <p:spTree>
@@ -4187,7 +4411,7 @@
 </p:sld>
 </file>
 
-<file path=ppt/slides/slide14.xml><?xml version="1.0" encoding="utf-8"?>
+<file path=ppt/slides/slide15.xml><?xml version="1.0" encoding="utf-8"?>
 <p:sld xmlns:a="http://schemas.openxmlformats.org/drawingml/2006/main" xmlns:r="http://schemas.openxmlformats.org/officeDocument/2006/relationships" xmlns:p="http://schemas.openxmlformats.org/presentationml/2006/main">
   <p:cSld>
     <p:spTree>
@@ -4460,6 +4684,36 @@
           </a:prstGeom>
         </p:spPr>
       </p:pic>
+      <p:sp>
+        <p:nvSpPr>
+          <p:cNvPr id="3" name="TextBox 2"/>
+          <p:cNvSpPr txBox="1"/>
+          <p:nvPr/>
+        </p:nvSpPr>
+        <p:spPr>
+          <a:xfrm>
+            <a:off x="1528965" y="5400769"/>
+            <a:ext cx="6161943" cy="369332"/>
+          </a:xfrm>
+          <a:prstGeom prst="rect">
+            <a:avLst/>
+          </a:prstGeom>
+          <a:noFill/>
+        </p:spPr>
+        <p:txBody>
+          <a:bodyPr wrap="none" rtlCol="0">
+            <a:spAutoFit/>
+          </a:bodyPr>
+          <a:lstStyle/>
+          <a:p>
+            <a:r>
+              <a:rPr lang="en-US" dirty="0" smtClean="0"/>
+              <a:t>Methods always take the current instance as the first argument.</a:t>
+            </a:r>
+            <a:endParaRPr lang="en-US" dirty="0"/>
+          </a:p>
+        </p:txBody>
+      </p:sp>
     </p:spTree>
     <p:extLst>
       <p:ext uri="{BB962C8B-B14F-4D97-AF65-F5344CB8AC3E}">
@@ -4481,6 +4735,242 @@
 </file>
 
 <file path=ppt/slides/slide3.xml><?xml version="1.0" encoding="utf-8"?>
+<p:sld xmlns:a="http://schemas.openxmlformats.org/drawingml/2006/main" xmlns:r="http://schemas.openxmlformats.org/officeDocument/2006/relationships" xmlns:p="http://schemas.openxmlformats.org/presentationml/2006/main">
+  <p:cSld>
+    <p:spTree>
+      <p:nvGrpSpPr>
+        <p:cNvPr id="1" name=""/>
+        <p:cNvGrpSpPr/>
+        <p:nvPr/>
+      </p:nvGrpSpPr>
+      <p:grpSpPr>
+        <a:xfrm>
+          <a:off x="0" y="0"/>
+          <a:ext cx="0" cy="0"/>
+          <a:chOff x="0" y="0"/>
+          <a:chExt cx="0" cy="0"/>
+        </a:xfrm>
+      </p:grpSpPr>
+      <p:sp>
+        <p:nvSpPr>
+          <p:cNvPr id="2" name="Title 1"/>
+          <p:cNvSpPr>
+            <a:spLocks noGrp="1"/>
+          </p:cNvSpPr>
+          <p:nvPr>
+            <p:ph type="title"/>
+          </p:nvPr>
+        </p:nvSpPr>
+        <p:spPr/>
+        <p:txBody>
+          <a:bodyPr/>
+          <a:lstStyle/>
+          <a:p>
+            <a:pPr algn="ctr"/>
+            <a:r>
+              <a:rPr lang="en-US" dirty="0" smtClean="0"/>
+              <a:t>Would I lie to you?</a:t>
+            </a:r>
+            <a:endParaRPr lang="en-US" dirty="0"/>
+          </a:p>
+        </p:txBody>
+      </p:sp>
+      <p:pic>
+        <p:nvPicPr>
+          <p:cNvPr id="4" name="Content Placeholder 3"/>
+          <p:cNvPicPr>
+            <a:picLocks noGrp="1" noChangeAspect="1"/>
+          </p:cNvPicPr>
+          <p:nvPr>
+            <p:ph idx="1"/>
+          </p:nvPr>
+        </p:nvPicPr>
+        <p:blipFill>
+          <a:blip r:embed="rId3">
+            <a:extLst>
+              <a:ext uri="{28A0092B-C50C-407E-A947-70E740481C1C}">
+                <a14:useLocalDpi xmlns:a14="http://schemas.microsoft.com/office/drawing/2010/main" val="0"/>
+              </a:ext>
+            </a:extLst>
+          </a:blip>
+          <a:stretch>
+            <a:fillRect/>
+          </a:stretch>
+        </p:blipFill>
+        <p:spPr>
+          <a:xfrm>
+            <a:off x="2203450" y="1690688"/>
+            <a:ext cx="7785100" cy="1905000"/>
+          </a:xfrm>
+        </p:spPr>
+      </p:pic>
+      <p:pic>
+        <p:nvPicPr>
+          <p:cNvPr id="5" name="Picture 4"/>
+          <p:cNvPicPr>
+            <a:picLocks noChangeAspect="1"/>
+          </p:cNvPicPr>
+          <p:nvPr/>
+        </p:nvPicPr>
+        <p:blipFill>
+          <a:blip r:embed="rId4">
+            <a:extLst>
+              <a:ext uri="{28A0092B-C50C-407E-A947-70E740481C1C}">
+                <a14:useLocalDpi xmlns:a14="http://schemas.microsoft.com/office/drawing/2010/main" val="0"/>
+              </a:ext>
+            </a:extLst>
+          </a:blip>
+          <a:stretch>
+            <a:fillRect/>
+          </a:stretch>
+        </p:blipFill>
+        <p:spPr>
+          <a:xfrm>
+            <a:off x="9801412" y="4624575"/>
+            <a:ext cx="1552388" cy="1552388"/>
+          </a:xfrm>
+          <a:prstGeom prst="rect">
+            <a:avLst/>
+          </a:prstGeom>
+        </p:spPr>
+      </p:pic>
+      <p:sp>
+        <p:nvSpPr>
+          <p:cNvPr id="6" name="TextBox 5"/>
+          <p:cNvSpPr txBox="1"/>
+          <p:nvPr/>
+        </p:nvSpPr>
+        <p:spPr>
+          <a:xfrm>
+            <a:off x="3075709" y="5260769"/>
+            <a:ext cx="184731" cy="369332"/>
+          </a:xfrm>
+          <a:prstGeom prst="rect">
+            <a:avLst/>
+          </a:prstGeom>
+          <a:noFill/>
+        </p:spPr>
+        <p:txBody>
+          <a:bodyPr wrap="none" rtlCol="0">
+            <a:spAutoFit/>
+          </a:bodyPr>
+          <a:lstStyle/>
+          <a:p>
+            <a:endParaRPr lang="en-US" dirty="0"/>
+          </a:p>
+        </p:txBody>
+      </p:sp>
+      <p:sp>
+        <p:nvSpPr>
+          <p:cNvPr id="7" name="TextBox 6"/>
+          <p:cNvSpPr txBox="1"/>
+          <p:nvPr/>
+        </p:nvSpPr>
+        <p:spPr>
+          <a:xfrm>
+            <a:off x="1282535" y="4243562"/>
+            <a:ext cx="8741688" cy="1200329"/>
+          </a:xfrm>
+          <a:prstGeom prst="rect">
+            <a:avLst/>
+          </a:prstGeom>
+          <a:noFill/>
+        </p:spPr>
+        <p:txBody>
+          <a:bodyPr wrap="none" rtlCol="0">
+            <a:spAutoFit/>
+          </a:bodyPr>
+          <a:lstStyle/>
+          <a:p>
+            <a:pPr marL="285750" indent="-285750">
+              <a:buFont typeface="Arial" charset="0"/>
+              <a:buChar char="•"/>
+            </a:pPr>
+            <a:r>
+              <a:rPr lang="en-US" dirty="0" smtClean="0"/>
+              <a:t>We can use decorators to declare static methods.</a:t>
+            </a:r>
+          </a:p>
+          <a:p>
+            <a:pPr marL="285750" indent="-285750">
+              <a:buFont typeface="Arial" charset="0"/>
+              <a:buChar char="•"/>
+            </a:pPr>
+            <a:r>
+              <a:rPr lang="en-US" dirty="0" smtClean="0"/>
+              <a:t>Static methods belong to an object but don’t have access to its properties.</a:t>
+            </a:r>
+          </a:p>
+          <a:p>
+            <a:pPr marL="285750" indent="-285750">
+              <a:buFont typeface="Arial" charset="0"/>
+              <a:buChar char="•"/>
+            </a:pPr>
+            <a:endParaRPr lang="en-US" dirty="0"/>
+          </a:p>
+          <a:p>
+            <a:pPr marL="285750" indent="-285750">
+              <a:buFont typeface="Arial" charset="0"/>
+              <a:buChar char="•"/>
+            </a:pPr>
+            <a:r>
+              <a:rPr lang="en-US" dirty="0" smtClean="0"/>
+              <a:t>Other decorators are also available </a:t>
+            </a:r>
+            <a:r>
+              <a:rPr lang="mr-IN" dirty="0" smtClean="0"/>
+              <a:t>–</a:t>
+            </a:r>
+            <a:r>
+              <a:rPr lang="en-US" dirty="0" smtClean="0"/>
+              <a:t> notably </a:t>
+            </a:r>
+            <a:r>
+              <a:rPr lang="en-US" dirty="0" smtClean="0">
+                <a:latin typeface="Consolas" charset="0"/>
+                <a:ea typeface="Consolas" charset="0"/>
+                <a:cs typeface="Consolas" charset="0"/>
+              </a:rPr>
+              <a:t>@</a:t>
+            </a:r>
+            <a:r>
+              <a:rPr lang="en-US" dirty="0" err="1" smtClean="0">
+                <a:latin typeface="Consolas" charset="0"/>
+                <a:ea typeface="Consolas" charset="0"/>
+                <a:cs typeface="Consolas" charset="0"/>
+              </a:rPr>
+              <a:t>classmethod</a:t>
+            </a:r>
+            <a:r>
+              <a:rPr lang="en-US" dirty="0" smtClean="0">
+                <a:latin typeface="Consolas" charset="0"/>
+                <a:ea typeface="Consolas" charset="0"/>
+                <a:cs typeface="Consolas" charset="0"/>
+              </a:rPr>
+              <a:t> </a:t>
+            </a:r>
+            <a:r>
+              <a:rPr lang="en-US" dirty="0" smtClean="0"/>
+              <a:t>(used to create Factories)</a:t>
+            </a:r>
+            <a:endParaRPr lang="en-US" dirty="0"/>
+          </a:p>
+        </p:txBody>
+      </p:sp>
+    </p:spTree>
+    <p:extLst>
+      <p:ext uri="{BB962C8B-B14F-4D97-AF65-F5344CB8AC3E}">
+        <p14:creationId xmlns:p14="http://schemas.microsoft.com/office/powerpoint/2010/main" val="1486612146"/>
+      </p:ext>
+    </p:extLst>
+  </p:cSld>
+  <p:clrMapOvr>
+    <a:masterClrMapping/>
+  </p:clrMapOvr>
+</p:sld>
+</file>
+
+<file path=ppt/slides/slide4.xml><?xml version="1.0" encoding="utf-8"?>
 <p:sld xmlns:a="http://schemas.openxmlformats.org/drawingml/2006/main" xmlns:r="http://schemas.openxmlformats.org/officeDocument/2006/relationships" xmlns:p="http://schemas.openxmlformats.org/presentationml/2006/main">
   <p:cSld>
     <p:spTree>
@@ -4628,7 +5118,7 @@
 </p:sld>
 </file>
 
-<file path=ppt/slides/slide4.xml><?xml version="1.0" encoding="utf-8"?>
+<file path=ppt/slides/slide5.xml><?xml version="1.0" encoding="utf-8"?>
 <p:sld xmlns:a="http://schemas.openxmlformats.org/drawingml/2006/main" xmlns:r="http://schemas.openxmlformats.org/officeDocument/2006/relationships" xmlns:p="http://schemas.openxmlformats.org/presentationml/2006/main">
   <p:cSld>
     <p:spTree>
@@ -4741,7 +5231,7 @@
 </p:sld>
 </file>
 
-<file path=ppt/slides/slide5.xml><?xml version="1.0" encoding="utf-8"?>
+<file path=ppt/slides/slide6.xml><?xml version="1.0" encoding="utf-8"?>
 <p:sld xmlns:a="http://schemas.openxmlformats.org/drawingml/2006/main" xmlns:r="http://schemas.openxmlformats.org/officeDocument/2006/relationships" xmlns:p="http://schemas.openxmlformats.org/presentationml/2006/main">
   <p:cSld>
     <p:spTree>
@@ -4855,7 +5345,7 @@
 </p:sld>
 </file>
 
-<file path=ppt/slides/slide6.xml><?xml version="1.0" encoding="utf-8"?>
+<file path=ppt/slides/slide7.xml><?xml version="1.0" encoding="utf-8"?>
 <p:sld xmlns:a="http://schemas.openxmlformats.org/drawingml/2006/main" xmlns:r="http://schemas.openxmlformats.org/officeDocument/2006/relationships" xmlns:p="http://schemas.openxmlformats.org/presentationml/2006/main">
   <p:cSld>
     <p:spTree>
@@ -4975,7 +5465,7 @@
 </p:sld>
 </file>
 
-<file path=ppt/slides/slide7.xml><?xml version="1.0" encoding="utf-8"?>
+<file path=ppt/slides/slide8.xml><?xml version="1.0" encoding="utf-8"?>
 <p:sld xmlns:a="http://schemas.openxmlformats.org/drawingml/2006/main" xmlns:r="http://schemas.openxmlformats.org/officeDocument/2006/relationships" xmlns:p="http://schemas.openxmlformats.org/presentationml/2006/main">
   <p:cSld>
     <p:spTree>
@@ -5119,7 +5609,7 @@
 </p:sld>
 </file>
 
-<file path=ppt/slides/slide8.xml><?xml version="1.0" encoding="utf-8"?>
+<file path=ppt/slides/slide9.xml><?xml version="1.0" encoding="utf-8"?>
 <p:sld xmlns:a="http://schemas.openxmlformats.org/drawingml/2006/main" xmlns:r="http://schemas.openxmlformats.org/officeDocument/2006/relationships" xmlns:p="http://schemas.openxmlformats.org/presentationml/2006/main">
   <p:cSld>
     <p:spTree>
@@ -5193,137 +5683,6 @@
     <p:extLst>
       <p:ext uri="{BB962C8B-B14F-4D97-AF65-F5344CB8AC3E}">
         <p14:creationId xmlns:p14="http://schemas.microsoft.com/office/powerpoint/2010/main" val="698603136"/>
-      </p:ext>
-    </p:extLst>
-  </p:cSld>
-  <p:clrMapOvr>
-    <a:masterClrMapping/>
-  </p:clrMapOvr>
-  <p:timing>
-    <p:tnLst>
-      <p:par>
-        <p:cTn id="1" dur="indefinite" restart="never" nodeType="tmRoot"/>
-      </p:par>
-    </p:tnLst>
-  </p:timing>
-</p:sld>
-</file>
-
-<file path=ppt/slides/slide9.xml><?xml version="1.0" encoding="utf-8"?>
-<p:sld xmlns:a="http://schemas.openxmlformats.org/drawingml/2006/main" xmlns:r="http://schemas.openxmlformats.org/officeDocument/2006/relationships" xmlns:p="http://schemas.openxmlformats.org/presentationml/2006/main">
-  <p:cSld>
-    <p:spTree>
-      <p:nvGrpSpPr>
-        <p:cNvPr id="1" name=""/>
-        <p:cNvGrpSpPr/>
-        <p:nvPr/>
-      </p:nvGrpSpPr>
-      <p:grpSpPr>
-        <a:xfrm>
-          <a:off x="0" y="0"/>
-          <a:ext cx="0" cy="0"/>
-          <a:chOff x="0" y="0"/>
-          <a:chExt cx="0" cy="0"/>
-        </a:xfrm>
-      </p:grpSpPr>
-      <p:sp>
-        <p:nvSpPr>
-          <p:cNvPr id="2" name="Title 1"/>
-          <p:cNvSpPr>
-            <a:spLocks noGrp="1"/>
-          </p:cNvSpPr>
-          <p:nvPr>
-            <p:ph type="title"/>
-          </p:nvPr>
-        </p:nvSpPr>
-        <p:spPr/>
-        <p:txBody>
-          <a:bodyPr/>
-          <a:lstStyle/>
-          <a:p>
-            <a:pPr algn="ctr"/>
-            <a:r>
-              <a:rPr lang="en-US" dirty="0" smtClean="0"/>
-              <a:t>And now for something completely different</a:t>
-            </a:r>
-            <a:endParaRPr lang="en-US" dirty="0"/>
-          </a:p>
-        </p:txBody>
-      </p:sp>
-      <p:pic>
-        <p:nvPicPr>
-          <p:cNvPr id="5" name="Content Placeholder 4"/>
-          <p:cNvPicPr>
-            <a:picLocks noGrp="1" noChangeAspect="1"/>
-          </p:cNvPicPr>
-          <p:nvPr>
-            <p:ph idx="1"/>
-          </p:nvPr>
-        </p:nvPicPr>
-        <p:blipFill>
-          <a:blip r:embed="rId2">
-            <a:extLst>
-              <a:ext uri="{28A0092B-C50C-407E-A947-70E740481C1C}">
-                <a14:useLocalDpi xmlns:a14="http://schemas.microsoft.com/office/drawing/2010/main" val="0"/>
-              </a:ext>
-            </a:extLst>
-          </a:blip>
-          <a:stretch>
-            <a:fillRect/>
-          </a:stretch>
-        </p:blipFill>
-        <p:spPr>
-          <a:xfrm>
-            <a:off x="1498600" y="1690688"/>
-            <a:ext cx="9194800" cy="4000500"/>
-          </a:xfrm>
-        </p:spPr>
-      </p:pic>
-      <p:sp>
-        <p:nvSpPr>
-          <p:cNvPr id="8" name="TextBox 7"/>
-          <p:cNvSpPr txBox="1"/>
-          <p:nvPr/>
-        </p:nvSpPr>
-        <p:spPr>
-          <a:xfrm>
-            <a:off x="2167210" y="5947155"/>
-            <a:ext cx="7857573" cy="369332"/>
-          </a:xfrm>
-          <a:prstGeom prst="rect">
-            <a:avLst/>
-          </a:prstGeom>
-          <a:noFill/>
-        </p:spPr>
-        <p:txBody>
-          <a:bodyPr wrap="square" rtlCol="0">
-            <a:spAutoFit/>
-          </a:bodyPr>
-          <a:lstStyle/>
-          <a:p>
-            <a:pPr algn="ctr"/>
-            <a:r>
-              <a:rPr lang="en-US" dirty="0" smtClean="0"/>
-              <a:t>The equivalent in Python of typing </a:t>
-            </a:r>
-            <a:r>
-              <a:rPr lang="en-US" dirty="0" smtClean="0">
-                <a:hlinkClick r:id="rId3"/>
-              </a:rPr>
-              <a:t>https://www.expedia.co.uk/</a:t>
-            </a:r>
-            <a:r>
-              <a:rPr lang="en-US" dirty="0" smtClean="0"/>
-              <a:t> into your browser.</a:t>
-            </a:r>
-            <a:endParaRPr lang="en-US" dirty="0"/>
-          </a:p>
-        </p:txBody>
-      </p:sp>
-    </p:spTree>
-    <p:extLst>
-      <p:ext uri="{BB962C8B-B14F-4D97-AF65-F5344CB8AC3E}">
-        <p14:creationId xmlns:p14="http://schemas.microsoft.com/office/powerpoint/2010/main" val="262951805"/>
       </p:ext>
     </p:extLst>
   </p:cSld>

</xml_diff>

<commit_message>
Updated API reference location
</commit_message>
<xml_diff>
--- a/Python as an additional language/Lesson 6/Session 6.pptx
+++ b/Python as an additional language/Lesson 6/Session 6.pptx
@@ -211,7 +211,7 @@
           <a:p>
             <a:fld id="{DA5E5883-E103-8245-BD61-201BBE7EF848}" type="datetimeFigureOut">
               <a:rPr lang="en-US" smtClean="0"/>
-              <a:t>6/30/17</a:t>
+              <a:t>7/6/17</a:t>
             </a:fld>
             <a:endParaRPr lang="en-US"/>
           </a:p>
@@ -702,7 +702,7 @@
           <a:p>
             <a:fld id="{6772480F-65C4-1944-8E55-882D628A8DFA}" type="datetimeFigureOut">
               <a:rPr lang="en-US" smtClean="0"/>
-              <a:t>6/30/17</a:t>
+              <a:t>7/6/17</a:t>
             </a:fld>
             <a:endParaRPr lang="en-US"/>
           </a:p>
@@ -872,7 +872,7 @@
           <a:p>
             <a:fld id="{6772480F-65C4-1944-8E55-882D628A8DFA}" type="datetimeFigureOut">
               <a:rPr lang="en-US" smtClean="0"/>
-              <a:t>6/30/17</a:t>
+              <a:t>7/6/17</a:t>
             </a:fld>
             <a:endParaRPr lang="en-US"/>
           </a:p>
@@ -1052,7 +1052,7 @@
           <a:p>
             <a:fld id="{6772480F-65C4-1944-8E55-882D628A8DFA}" type="datetimeFigureOut">
               <a:rPr lang="en-US" smtClean="0"/>
-              <a:t>6/30/17</a:t>
+              <a:t>7/6/17</a:t>
             </a:fld>
             <a:endParaRPr lang="en-US"/>
           </a:p>
@@ -1222,7 +1222,7 @@
           <a:p>
             <a:fld id="{6772480F-65C4-1944-8E55-882D628A8DFA}" type="datetimeFigureOut">
               <a:rPr lang="en-US" smtClean="0"/>
-              <a:t>6/30/17</a:t>
+              <a:t>7/6/17</a:t>
             </a:fld>
             <a:endParaRPr lang="en-US"/>
           </a:p>
@@ -1468,7 +1468,7 @@
           <a:p>
             <a:fld id="{6772480F-65C4-1944-8E55-882D628A8DFA}" type="datetimeFigureOut">
               <a:rPr lang="en-US" smtClean="0"/>
-              <a:t>6/30/17</a:t>
+              <a:t>7/6/17</a:t>
             </a:fld>
             <a:endParaRPr lang="en-US"/>
           </a:p>
@@ -1700,7 +1700,7 @@
           <a:p>
             <a:fld id="{6772480F-65C4-1944-8E55-882D628A8DFA}" type="datetimeFigureOut">
               <a:rPr lang="en-US" smtClean="0"/>
-              <a:t>6/30/17</a:t>
+              <a:t>7/6/17</a:t>
             </a:fld>
             <a:endParaRPr lang="en-US"/>
           </a:p>
@@ -2067,7 +2067,7 @@
           <a:p>
             <a:fld id="{6772480F-65C4-1944-8E55-882D628A8DFA}" type="datetimeFigureOut">
               <a:rPr lang="en-US" smtClean="0"/>
-              <a:t>6/30/17</a:t>
+              <a:t>7/6/17</a:t>
             </a:fld>
             <a:endParaRPr lang="en-US"/>
           </a:p>
@@ -2185,7 +2185,7 @@
           <a:p>
             <a:fld id="{6772480F-65C4-1944-8E55-882D628A8DFA}" type="datetimeFigureOut">
               <a:rPr lang="en-US" smtClean="0"/>
-              <a:t>6/30/17</a:t>
+              <a:t>7/6/17</a:t>
             </a:fld>
             <a:endParaRPr lang="en-US"/>
           </a:p>
@@ -2280,7 +2280,7 @@
           <a:p>
             <a:fld id="{6772480F-65C4-1944-8E55-882D628A8DFA}" type="datetimeFigureOut">
               <a:rPr lang="en-US" smtClean="0"/>
-              <a:t>6/30/17</a:t>
+              <a:t>7/6/17</a:t>
             </a:fld>
             <a:endParaRPr lang="en-US"/>
           </a:p>
@@ -2557,7 +2557,7 @@
           <a:p>
             <a:fld id="{6772480F-65C4-1944-8E55-882D628A8DFA}" type="datetimeFigureOut">
               <a:rPr lang="en-US" smtClean="0"/>
-              <a:t>6/30/17</a:t>
+              <a:t>7/6/17</a:t>
             </a:fld>
             <a:endParaRPr lang="en-US"/>
           </a:p>
@@ -2810,7 +2810,7 @@
           <a:p>
             <a:fld id="{6772480F-65C4-1944-8E55-882D628A8DFA}" type="datetimeFigureOut">
               <a:rPr lang="en-US" smtClean="0"/>
-              <a:t>6/30/17</a:t>
+              <a:t>7/6/17</a:t>
             </a:fld>
             <a:endParaRPr lang="en-US"/>
           </a:p>
@@ -3023,7 +3023,7 @@
           <a:p>
             <a:fld id="{6772480F-65C4-1944-8E55-882D628A8DFA}" type="datetimeFigureOut">
               <a:rPr lang="en-US" smtClean="0"/>
-              <a:t>6/30/17</a:t>
+              <a:t>7/6/17</a:t>
             </a:fld>
             <a:endParaRPr lang="en-US"/>
           </a:p>
@@ -4498,17 +4498,21 @@
               <a:rPr lang="en-US" dirty="0">
                 <a:hlinkClick r:id="rId2"/>
               </a:rPr>
-              <a:t>http://</a:t>
+              <a:t>https://</a:t>
             </a:r>
             <a:r>
               <a:rPr lang="en-US" dirty="0" smtClean="0">
                 <a:hlinkClick r:id="rId2"/>
               </a:rPr>
-              <a:t>docs.themoviedb.apiary.io/</a:t>
-            </a:r>
-            <a:r>
-              <a:rPr lang="en-US" dirty="0" smtClean="0"/>
-              <a:t> may help</a:t>
+              <a:t>developers.themoviedb.org/</a:t>
+            </a:r>
+            <a:r>
+              <a:rPr lang="en-US" dirty="0" smtClean="0"/>
+              <a:t> may </a:t>
+            </a:r>
+            <a:r>
+              <a:rPr lang="en-US" dirty="0" smtClean="0"/>
+              <a:t>help</a:t>
             </a:r>
           </a:p>
           <a:p>
@@ -4704,11 +4708,7 @@
           <a:p>
             <a:r>
               <a:rPr lang="en-US" dirty="0" smtClean="0"/>
-              <a:t>Instance methods </a:t>
-            </a:r>
-            <a:r>
-              <a:rPr lang="en-US" dirty="0" smtClean="0"/>
-              <a:t>always take the current instance as the first argument.</a:t>
+              <a:t>Instance methods always take the current instance as the first argument.</a:t>
             </a:r>
             <a:endParaRPr lang="en-US" dirty="0"/>
           </a:p>
@@ -4923,14 +4923,6 @@
               </a:rPr>
               <a:t> </a:t>
             </a:r>
-            <a:r>
-              <a:rPr lang="en-US" dirty="0" smtClean="0">
-                <a:latin typeface="Consolas" charset="0"/>
-                <a:ea typeface="Consolas" charset="0"/>
-                <a:cs typeface="Consolas" charset="0"/>
-              </a:rPr>
-              <a:t/>
-            </a:r>
             <a:br>
               <a:rPr lang="en-US" dirty="0" smtClean="0">
                 <a:latin typeface="Consolas" charset="0"/>
@@ -4948,11 +4940,7 @@
             </a:r>
             <a:r>
               <a:rPr lang="en-US" dirty="0" smtClean="0"/>
-              <a:t>(</a:t>
-            </a:r>
-            <a:r>
-              <a:rPr lang="en-US" dirty="0" smtClean="0"/>
-              <a:t>used to create Factories)</a:t>
+              <a:t>(used to create Factories)</a:t>
             </a:r>
             <a:endParaRPr lang="en-US" dirty="0"/>
           </a:p>

</xml_diff>

<commit_message>
Changed slide 3 example slightly
</commit_message>
<xml_diff>
--- a/Python as an additional language/Lesson 6/Session 6.pptx
+++ b/Python as an additional language/Lesson 6/Session 6.pptx
@@ -4777,35 +4777,6 @@
       </p:sp>
       <p:pic>
         <p:nvPicPr>
-          <p:cNvPr id="4" name="Content Placeholder 3"/>
-          <p:cNvPicPr>
-            <a:picLocks noGrp="1" noChangeAspect="1"/>
-          </p:cNvPicPr>
-          <p:nvPr>
-            <p:ph idx="1"/>
-          </p:nvPr>
-        </p:nvPicPr>
-        <p:blipFill>
-          <a:blip r:embed="rId3">
-            <a:extLst>
-              <a:ext uri="{28A0092B-C50C-407E-A947-70E740481C1C}">
-                <a14:useLocalDpi xmlns:a14="http://schemas.microsoft.com/office/drawing/2010/main" val="0"/>
-              </a:ext>
-            </a:extLst>
-          </a:blip>
-          <a:stretch>
-            <a:fillRect/>
-          </a:stretch>
-        </p:blipFill>
-        <p:spPr>
-          <a:xfrm>
-            <a:off x="2203450" y="1690688"/>
-            <a:ext cx="7785100" cy="1905000"/>
-          </a:xfrm>
-        </p:spPr>
-      </p:pic>
-      <p:pic>
-        <p:nvPicPr>
           <p:cNvPr id="5" name="Picture 4"/>
           <p:cNvPicPr>
             <a:picLocks noChangeAspect="1"/>
@@ -4813,7 +4784,7 @@
           <p:nvPr/>
         </p:nvPicPr>
         <p:blipFill>
-          <a:blip r:embed="rId4">
+          <a:blip r:embed="rId3">
             <a:extLst>
               <a:ext uri="{28A0092B-C50C-407E-A947-70E740481C1C}">
                 <a14:useLocalDpi xmlns:a14="http://schemas.microsoft.com/office/drawing/2010/main" val="0"/>
@@ -4946,6 +4917,35 @@
           </a:p>
         </p:txBody>
       </p:sp>
+      <p:pic>
+        <p:nvPicPr>
+          <p:cNvPr id="6" name="Content Placeholder 5"/>
+          <p:cNvPicPr>
+            <a:picLocks noGrp="1" noChangeAspect="1"/>
+          </p:cNvPicPr>
+          <p:nvPr>
+            <p:ph idx="1"/>
+          </p:nvPr>
+        </p:nvPicPr>
+        <p:blipFill>
+          <a:blip r:embed="rId4">
+            <a:extLst>
+              <a:ext uri="{28A0092B-C50C-407E-A947-70E740481C1C}">
+                <a14:useLocalDpi xmlns:a14="http://schemas.microsoft.com/office/drawing/2010/main" val="0"/>
+              </a:ext>
+            </a:extLst>
+          </a:blip>
+          <a:stretch>
+            <a:fillRect/>
+          </a:stretch>
+        </p:blipFill>
+        <p:spPr>
+          <a:xfrm>
+            <a:off x="2349500" y="2173375"/>
+            <a:ext cx="7493000" cy="1587500"/>
+          </a:xfrm>
+        </p:spPr>
+      </p:pic>
     </p:spTree>
     <p:extLst>
       <p:ext uri="{BB962C8B-B14F-4D97-AF65-F5344CB8AC3E}">

</xml_diff>